<commit_message>
Added ability to build...except for sphere
</commit_message>
<xml_diff>
--- a/Decentralized Collective Construction.pptx
+++ b/Decentralized Collective Construction.pptx
@@ -118,7 +118,7 @@
   </p:defaultTextStyle>
   <p:extLst>
     <p:ext uri="{EFAFB233-063F-42B5-8137-9DF3F51BA10A}">
-      <p15:sldGuideLst xmlns:p15="http://schemas.microsoft.com/office/powerpoint/2012/main">
+      <p15:sldGuideLst xmlns="" xmlns:p15="http://schemas.microsoft.com/office/powerpoint/2012/main">
         <p15:guide id="1" pos="3839" userDrawn="1">
           <p15:clr>
             <a:srgbClr val="A4A3A4"/>
@@ -132,7 +132,7 @@
       </p15:sldGuideLst>
     </p:ext>
     <p:ext uri="{2D200454-40CA-4A62-9FC3-DE9A4176ACB9}">
-      <p15:notesGuideLst xmlns:p15="http://schemas.microsoft.com/office/powerpoint/2012/main"/>
+      <p15:notesGuideLst xmlns="" xmlns:p15="http://schemas.microsoft.com/office/powerpoint/2012/main"/>
     </p:ext>
   </p:extLst>
 </p:presentation>
@@ -2081,7 +2081,7 @@
             <a:gs pos="0">
               <a:schemeClr val="accent1">
                 <a:shade val="90000"/>
-                <a:hueOff val="361868"/>
+                <a:hueOff val="361866"/>
                 <a:satOff val="12502"/>
                 <a:lumOff val="24506"/>
                 <a:alphaOff val="0"/>
@@ -2093,7 +2093,7 @@
             <a:gs pos="50000">
               <a:schemeClr val="accent1">
                 <a:shade val="90000"/>
-                <a:hueOff val="361868"/>
+                <a:hueOff val="361866"/>
                 <a:satOff val="12502"/>
                 <a:lumOff val="24506"/>
                 <a:alphaOff val="0"/>
@@ -2105,7 +2105,7 @@
             <a:gs pos="100000">
               <a:schemeClr val="accent1">
                 <a:shade val="90000"/>
-                <a:hueOff val="361868"/>
+                <a:hueOff val="361866"/>
                 <a:satOff val="12502"/>
                 <a:lumOff val="24506"/>
                 <a:alphaOff val="0"/>
@@ -4127,7 +4127,7 @@
           <a:p>
             <a:fld id="{59088EAF-6ECA-4616-85EF-35AA19C641F3}" type="datetimeFigureOut">
               <a:rPr lang="en-US"/>
-              <a:t>6/25/2013</a:t>
+              <a:t>6/26/2013</a:t>
             </a:fld>
             <a:endParaRPr dirty="0"/>
           </a:p>
@@ -4292,7 +4292,7 @@
           <a:p>
             <a:fld id="{3ABD2D7A-D230-4F91-BD59-0A39C2703BA8}" type="datetimeFigureOut">
               <a:rPr lang="en-US"/>
-              <a:t>6/25/2013</a:t>
+              <a:t>6/26/2013</a:t>
             </a:fld>
             <a:endParaRPr dirty="0"/>
           </a:p>
@@ -4894,7 +4894,7 @@
           <a:p>
             <a:fld id="{03F41C87-7AD9-4845-A077-840E4A0F3F06}" type="datetimeFigureOut">
               <a:rPr lang="en-US"/>
-              <a:t>6/25/2013</a:t>
+              <a:t>6/26/2013</a:t>
             </a:fld>
             <a:endParaRPr dirty="0"/>
           </a:p>
@@ -5093,7 +5093,7 @@
           <a:p>
             <a:fld id="{03F41C87-7AD9-4845-A077-840E4A0F3F06}" type="datetimeFigureOut">
               <a:rPr lang="en-US"/>
-              <a:t>6/25/2013</a:t>
+              <a:t>6/26/2013</a:t>
             </a:fld>
             <a:endParaRPr dirty="0"/>
           </a:p>
@@ -5289,7 +5289,7 @@
           <a:p>
             <a:fld id="{03F41C87-7AD9-4845-A077-840E4A0F3F06}" type="datetimeFigureOut">
               <a:rPr lang="en-US"/>
-              <a:t>6/25/2013</a:t>
+              <a:t>6/26/2013</a:t>
             </a:fld>
             <a:endParaRPr dirty="0"/>
           </a:p>
@@ -5576,7 +5576,7 @@
           <a:p>
             <a:fld id="{03F41C87-7AD9-4845-A077-840E4A0F3F06}" type="datetimeFigureOut">
               <a:rPr lang="en-US"/>
-              <a:t>6/25/2013</a:t>
+              <a:t>6/26/2013</a:t>
             </a:fld>
             <a:endParaRPr dirty="0"/>
           </a:p>
@@ -5887,7 +5887,7 @@
           <a:p>
             <a:fld id="{03F41C87-7AD9-4845-A077-840E4A0F3F06}" type="datetimeFigureOut">
               <a:rPr lang="en-US"/>
-              <a:t>6/25/2013</a:t>
+              <a:t>6/26/2013</a:t>
             </a:fld>
             <a:endParaRPr dirty="0"/>
           </a:p>
@@ -6350,7 +6350,7 @@
           <a:p>
             <a:fld id="{03F41C87-7AD9-4845-A077-840E4A0F3F06}" type="datetimeFigureOut">
               <a:rPr lang="en-US"/>
-              <a:t>6/25/2013</a:t>
+              <a:t>6/26/2013</a:t>
             </a:fld>
             <a:endParaRPr dirty="0"/>
           </a:p>
@@ -6487,7 +6487,7 @@
           <a:p>
             <a:fld id="{03F41C87-7AD9-4845-A077-840E4A0F3F06}" type="datetimeFigureOut">
               <a:rPr lang="en-US"/>
-              <a:t>6/25/2013</a:t>
+              <a:t>6/26/2013</a:t>
             </a:fld>
             <a:endParaRPr dirty="0"/>
           </a:p>
@@ -6609,7 +6609,7 @@
           <a:p>
             <a:fld id="{03F41C87-7AD9-4845-A077-840E4A0F3F06}" type="datetimeFigureOut">
               <a:rPr lang="en-US"/>
-              <a:t>6/25/2013</a:t>
+              <a:t>6/26/2013</a:t>
             </a:fld>
             <a:endParaRPr dirty="0"/>
           </a:p>
@@ -6938,7 +6938,7 @@
           <a:p>
             <a:fld id="{03F41C87-7AD9-4845-A077-840E4A0F3F06}" type="datetimeFigureOut">
               <a:rPr lang="en-US"/>
-              <a:t>6/25/2013</a:t>
+              <a:t>6/26/2013</a:t>
             </a:fld>
             <a:endParaRPr dirty="0"/>
           </a:p>
@@ -7257,7 +7257,7 @@
             <a:fld id="{03F41C87-7AD9-4845-A077-840E4A0F3F06}" type="datetimeFigureOut">
               <a:rPr lang="en-US"/>
               <a:pPr/>
-              <a:t>6/25/2013</a:t>
+              <a:t>6/26/2013</a:t>
             </a:fld>
             <a:endParaRPr dirty="0"/>
           </a:p>
@@ -7500,7 +7500,7 @@
             <a:fld id="{03F41C87-7AD9-4845-A077-840E4A0F3F06}" type="datetimeFigureOut">
               <a:rPr lang="en-US"/>
               <a:pPr/>
-              <a:t>6/25/2013</a:t>
+              <a:t>6/26/2013</a:t>
             </a:fld>
             <a:endParaRPr dirty="0"/>
           </a:p>
@@ -7927,7 +7927,7 @@
   </p:txStyles>
   <p:extLst>
     <p:ext uri="{27BBF7A9-308A-43DC-89C8-2F10F3537804}">
-      <p15:sldGuideLst xmlns:p15="http://schemas.microsoft.com/office/powerpoint/2012/main">
+      <p15:sldGuideLst xmlns="" xmlns:p15="http://schemas.microsoft.com/office/powerpoint/2012/main">
         <p15:guide id="1" pos="3839" userDrawn="1">
           <p15:clr>
             <a:srgbClr val="F26B43"/>
@@ -8466,7 +8466,7 @@
               <a:buChar char="•"/>
             </a:pPr>
             <a:r>
-              <a:rPr lang="en-US" sz="2200" dirty="0" smtClean="0"/>
+              <a:rPr lang="en-US" sz="2400" dirty="0" smtClean="0"/>
               <a:t>Wind</a:t>
             </a:r>
           </a:p>
@@ -8476,7 +8476,7 @@
               <a:buChar char="•"/>
             </a:pPr>
             <a:r>
-              <a:rPr lang="en-US" sz="2200" dirty="0" smtClean="0"/>
+              <a:rPr lang="en-US" sz="2400" dirty="0" smtClean="0"/>
               <a:t>Heat</a:t>
             </a:r>
           </a:p>
@@ -8486,7 +8486,7 @@
               <a:buChar char="•"/>
             </a:pPr>
             <a:r>
-              <a:rPr lang="en-US" sz="2200" dirty="0" smtClean="0"/>
+              <a:rPr lang="en-US" sz="2400" dirty="0" smtClean="0"/>
               <a:t>Structural Decay</a:t>
             </a:r>
           </a:p>
@@ -8496,7 +8496,7 @@
               <a:buChar char="•"/>
             </a:pPr>
             <a:r>
-              <a:rPr lang="en-US" sz="2200" dirty="0" smtClean="0"/>
+              <a:rPr lang="en-US" sz="2400" dirty="0" smtClean="0"/>
               <a:t>Extreme Environments</a:t>
             </a:r>
           </a:p>
@@ -9493,37 +9493,34 @@
           <a:lstStyle/>
           <a:p>
             <a:r>
-              <a:rPr lang="en-US" dirty="0" smtClean="0"/>
+              <a:rPr lang="en-US" sz="2800" dirty="0" smtClean="0"/>
               <a:t>Structural Analysis Program </a:t>
             </a:r>
           </a:p>
           <a:p>
             <a:pPr lvl="1"/>
             <a:r>
-              <a:rPr lang="en-US" dirty="0" smtClean="0"/>
+              <a:rPr lang="en-US" sz="2400" dirty="0" smtClean="0"/>
               <a:t>SAP 2000 OAPI</a:t>
             </a:r>
           </a:p>
           <a:p>
             <a:pPr lvl="1"/>
             <a:r>
-              <a:rPr lang="en-US" dirty="0" smtClean="0"/>
+              <a:rPr lang="en-US" sz="2400" dirty="0" smtClean="0"/>
               <a:t>Python Interface</a:t>
             </a:r>
           </a:p>
           <a:p>
             <a:r>
-              <a:rPr lang="en-US" smtClean="0"/>
-              <a:t>Mobile </a:t>
+              <a:rPr lang="en-US" sz="2800" dirty="0" smtClean="0"/>
+              <a:t>Mobile Swarm</a:t>
             </a:r>
+            <a:endParaRPr lang="en-US" dirty="0" smtClean="0"/>
+          </a:p>
+          <a:p>
             <a:r>
-              <a:rPr lang="en-US" dirty="0" smtClean="0"/>
-              <a:t>Swarm</a:t>
-            </a:r>
-          </a:p>
-          <a:p>
-            <a:r>
-              <a:rPr lang="en-US" dirty="0" smtClean="0"/>
+              <a:rPr lang="en-US" sz="2800" dirty="0" smtClean="0"/>
               <a:t>Random Rules</a:t>
             </a:r>
             <a:endParaRPr lang="en-US" dirty="0"/>
@@ -10172,7 +10169,11 @@
           <a:p>
             <a:r>
               <a:rPr lang="en-US" dirty="0" smtClean="0"/>
-              <a:t>Steps: Vertical Tower Simulation</a:t>
+              <a:t>Research Steps</a:t>
+            </a:r>
+            <a:r>
+              <a:rPr lang="en-US" dirty="0" smtClean="0"/>
+              <a:t>: Vertical Tower Simulation</a:t>
             </a:r>
             <a:endParaRPr lang="en-US" dirty="0"/>
           </a:p>

</xml_diff>